<commit_message>
tuning fonts & object widths
</commit_message>
<xml_diff>
--- a/powerpoints/000-A-Preclass-loop.pptx
+++ b/powerpoints/000-A-Preclass-loop.pptx
@@ -397,6 +397,11 @@
         </p:txBody>
       </p:sp>
     </p:spTree>
+    <p:extLst>
+      <p:ext uri="{BB962C8B-B14F-4D97-AF65-F5344CB8AC3E}">
+        <p14:creationId xmlns:p14="http://schemas.microsoft.com/office/powerpoint/2010/main" val="656080659"/>
+      </p:ext>
+    </p:extLst>
   </p:cSld>
   <p:clrMap bg1="lt1" tx1="dk1" bg2="lt2" tx2="dk2" accent1="accent1" accent2="accent2" accent3="accent3" accent4="accent4" accent5="accent5" accent6="accent6" hlink="hlink" folHlink="folHlink"/>
   <p:notesStyle>
@@ -765,7 +770,7 @@
           </a:ln>
           <a:extLst>
             <a:ext uri="{C572A759-6A51-4108-AA02-DFA0A04FC94B}">
-              <ma14:wrappingTextBoxFlag xmlns:ma14="http://schemas.microsoft.com/office/mac/drawingml/2011/main" xmlns="" val="1"/>
+              <ma14:wrappingTextBoxFlag xmlns="" xmlns:ma14="http://schemas.microsoft.com/office/mac/drawingml/2011/main" val="1"/>
             </a:ext>
           </a:extLst>
         </p:spPr>
@@ -804,7 +809,7 @@
           </a:ln>
           <a:extLst>
             <a:ext uri="{C572A759-6A51-4108-AA02-DFA0A04FC94B}">
-              <ma14:wrappingTextBoxFlag xmlns:ma14="http://schemas.microsoft.com/office/mac/drawingml/2011/main" xmlns="" val="1"/>
+              <ma14:wrappingTextBoxFlag xmlns="" xmlns:ma14="http://schemas.microsoft.com/office/mac/drawingml/2011/main" val="1"/>
             </a:ext>
           </a:extLst>
         </p:spPr>
@@ -1747,7 +1752,7 @@
           </a:ln>
           <a:extLst>
             <a:ext uri="{C572A759-6A51-4108-AA02-DFA0A04FC94B}">
-              <ma14:wrappingTextBoxFlag xmlns:ma14="http://schemas.microsoft.com/office/mac/drawingml/2011/main" xmlns="" val="1"/>
+              <ma14:wrappingTextBoxFlag xmlns="" xmlns:ma14="http://schemas.microsoft.com/office/mac/drawingml/2011/main" val="1"/>
             </a:ext>
           </a:extLst>
         </p:spPr>
@@ -1764,12 +1769,18 @@
               </a:defRPr>
             </a:pPr>
             <a:r>
-              <a:rPr b="0"/>
+              <a:rPr sz="9600" b="0" dirty="0"/>
               <a:t>Welcome to</a:t>
             </a:r>
             <a:r>
-              <a:t> Master the Tidyverse</a:t>
+              <a:rPr sz="9600" dirty="0"/>
+              <a:t> Master the </a:t>
             </a:r>
+            <a:r>
+              <a:rPr sz="9600" dirty="0" err="1"/>
+              <a:t>Tidyverse</a:t>
+            </a:r>
+            <a:endParaRPr sz="9600" dirty="0"/>
           </a:p>
         </p:txBody>
       </p:sp>
@@ -1927,7 +1938,7 @@
           </a:ln>
           <a:extLst>
             <a:ext uri="{C572A759-6A51-4108-AA02-DFA0A04FC94B}">
-              <ma14:wrappingTextBoxFlag xmlns:ma14="http://schemas.microsoft.com/office/mac/drawingml/2011/main" xmlns="" val="1"/>
+              <ma14:wrappingTextBoxFlag xmlns="" xmlns:ma14="http://schemas.microsoft.com/office/mac/drawingml/2011/main" val="1"/>
             </a:ext>
           </a:extLst>
         </p:spPr>
@@ -1974,7 +1985,7 @@
           </a:ln>
           <a:extLst>
             <a:ext uri="{C572A759-6A51-4108-AA02-DFA0A04FC94B}">
-              <ma14:wrappingTextBoxFlag xmlns:ma14="http://schemas.microsoft.com/office/mac/drawingml/2011/main" xmlns="" val="1"/>
+              <ma14:wrappingTextBoxFlag xmlns="" xmlns:ma14="http://schemas.microsoft.com/office/mac/drawingml/2011/main" val="1"/>
             </a:ext>
           </a:extLst>
         </p:spPr>
@@ -2013,6 +2024,13 @@
     <a:masterClrMapping/>
   </p:clrMapOvr>
   <p:transition spd="med"/>
+  <p:timing>
+    <p:tnLst>
+      <p:par>
+        <p:cTn id="1" dur="indefinite" restart="never" nodeType="tmRoot"/>
+      </p:par>
+    </p:tnLst>
+  </p:timing>
 </p:sld>
 </file>
 
@@ -2052,7 +2070,7 @@
           </a:ln>
           <a:extLst>
             <a:ext uri="{C572A759-6A51-4108-AA02-DFA0A04FC94B}">
-              <ma14:wrappingTextBoxFlag xmlns:ma14="http://schemas.microsoft.com/office/mac/drawingml/2011/main" xmlns="" val="1"/>
+              <ma14:wrappingTextBoxFlag xmlns="" xmlns:ma14="http://schemas.microsoft.com/office/mac/drawingml/2011/main" val="1"/>
             </a:ext>
           </a:extLst>
         </p:spPr>
@@ -2069,12 +2087,18 @@
               </a:defRPr>
             </a:pPr>
             <a:r>
-              <a:rPr b="0"/>
+              <a:rPr sz="9600" b="0" dirty="0"/>
               <a:t>Welcome to</a:t>
             </a:r>
             <a:r>
-              <a:t> Master the Tidyverse</a:t>
+              <a:rPr sz="9600" dirty="0"/>
+              <a:t> Master the </a:t>
             </a:r>
+            <a:r>
+              <a:rPr sz="9600" dirty="0" err="1"/>
+              <a:t>Tidyverse</a:t>
+            </a:r>
+            <a:endParaRPr sz="9600" dirty="0"/>
           </a:p>
         </p:txBody>
       </p:sp>
@@ -2239,7 +2263,7 @@
           </a:ln>
           <a:extLst>
             <a:ext uri="{C572A759-6A51-4108-AA02-DFA0A04FC94B}">
-              <ma14:wrappingTextBoxFlag xmlns:ma14="http://schemas.microsoft.com/office/mac/drawingml/2011/main" xmlns="" val="1"/>
+              <ma14:wrappingTextBoxFlag xmlns="" xmlns:ma14="http://schemas.microsoft.com/office/mac/drawingml/2011/main" val="1"/>
             </a:ext>
           </a:extLst>
         </p:spPr>
@@ -2293,7 +2317,7 @@
           </a:ln>
           <a:extLst>
             <a:ext uri="{C572A759-6A51-4108-AA02-DFA0A04FC94B}">
-              <ma14:wrappingTextBoxFlag xmlns:ma14="http://schemas.microsoft.com/office/mac/drawingml/2011/main" xmlns="" val="1"/>
+              <ma14:wrappingTextBoxFlag xmlns="" xmlns:ma14="http://schemas.microsoft.com/office/mac/drawingml/2011/main" val="1"/>
             </a:ext>
           </a:extLst>
         </p:spPr>
@@ -2340,7 +2364,7 @@
           </a:ln>
           <a:extLst>
             <a:ext uri="{C572A759-6A51-4108-AA02-DFA0A04FC94B}">
-              <ma14:wrappingTextBoxFlag xmlns:ma14="http://schemas.microsoft.com/office/mac/drawingml/2011/main" xmlns="" val="1"/>
+              <ma14:wrappingTextBoxFlag xmlns="" xmlns:ma14="http://schemas.microsoft.com/office/mac/drawingml/2011/main" val="1"/>
             </a:ext>
           </a:extLst>
         </p:spPr>
@@ -2379,6 +2403,13 @@
     <a:masterClrMapping/>
   </p:clrMapOvr>
   <p:transition spd="med"/>
+  <p:timing>
+    <p:tnLst>
+      <p:par>
+        <p:cTn id="1" dur="indefinite" restart="never" nodeType="tmRoot"/>
+      </p:par>
+    </p:tnLst>
+  </p:timing>
 </p:sld>
 </file>
 
@@ -2418,7 +2449,7 @@
           </a:ln>
           <a:extLst>
             <a:ext uri="{C572A759-6A51-4108-AA02-DFA0A04FC94B}">
-              <ma14:wrappingTextBoxFlag xmlns:ma14="http://schemas.microsoft.com/office/mac/drawingml/2011/main" xmlns="" val="1"/>
+              <ma14:wrappingTextBoxFlag xmlns="" xmlns:ma14="http://schemas.microsoft.com/office/mac/drawingml/2011/main" val="1"/>
             </a:ext>
           </a:extLst>
         </p:spPr>
@@ -2435,12 +2466,18 @@
               </a:defRPr>
             </a:pPr>
             <a:r>
-              <a:rPr b="0"/>
+              <a:rPr sz="9600" b="0" dirty="0"/>
               <a:t>Welcome to</a:t>
             </a:r>
             <a:r>
-              <a:t> Master the Tidyverse</a:t>
+              <a:rPr sz="9600" dirty="0"/>
+              <a:t> Master the </a:t>
             </a:r>
+            <a:r>
+              <a:rPr sz="9600" dirty="0" err="1"/>
+              <a:t>Tidyverse</a:t>
+            </a:r>
+            <a:endParaRPr sz="9600" dirty="0"/>
           </a:p>
         </p:txBody>
       </p:sp>
@@ -2558,7 +2595,7 @@
           </a:ln>
           <a:extLst>
             <a:ext uri="{C572A759-6A51-4108-AA02-DFA0A04FC94B}">
-              <ma14:wrappingTextBoxFlag xmlns:ma14="http://schemas.microsoft.com/office/mac/drawingml/2011/main" xmlns="" val="1"/>
+              <ma14:wrappingTextBoxFlag xmlns="" xmlns:ma14="http://schemas.microsoft.com/office/mac/drawingml/2011/main" val="1"/>
             </a:ext>
           </a:extLst>
         </p:spPr>
@@ -2603,7 +2640,7 @@
           </a:ln>
           <a:extLst>
             <a:ext uri="{C572A759-6A51-4108-AA02-DFA0A04FC94B}">
-              <ma14:wrappingTextBoxFlag xmlns:ma14="http://schemas.microsoft.com/office/mac/drawingml/2011/main" xmlns="" val="1"/>
+              <ma14:wrappingTextBoxFlag xmlns="" xmlns:ma14="http://schemas.microsoft.com/office/mac/drawingml/2011/main" val="1"/>
             </a:ext>
           </a:extLst>
         </p:spPr>
@@ -2650,7 +2687,7 @@
           </a:ln>
           <a:extLst>
             <a:ext uri="{C572A759-6A51-4108-AA02-DFA0A04FC94B}">
-              <ma14:wrappingTextBoxFlag xmlns:ma14="http://schemas.microsoft.com/office/mac/drawingml/2011/main" xmlns="" val="1"/>
+              <ma14:wrappingTextBoxFlag xmlns="" xmlns:ma14="http://schemas.microsoft.com/office/mac/drawingml/2011/main" val="1"/>
             </a:ext>
           </a:extLst>
         </p:spPr>
@@ -2688,7 +2725,7 @@
           <p:cNvPr id="10" name="Click on .Rmd file to open notebook">
             <a:extLst>
               <a:ext uri="{FF2B5EF4-FFF2-40B4-BE49-F238E27FC236}">
-                <a16:creationId xmlns:a16="http://schemas.microsoft.com/office/drawing/2014/main" id="{F3CC08FC-B7AE-4C19-800B-0CC5AECDAC0A}"/>
+                <a16:creationId xmlns:a16="http://schemas.microsoft.com/office/drawing/2014/main" xmlns="" id="{F3CC08FC-B7AE-4C19-800B-0CC5AECDAC0A}"/>
               </a:ext>
             </a:extLst>
           </p:cNvPr>
@@ -2715,7 +2752,7 @@
           </a:ln>
           <a:extLst>
             <a:ext uri="{C572A759-6A51-4108-AA02-DFA0A04FC94B}">
-              <ma14:wrappingTextBoxFlag xmlns:ma14="http://schemas.microsoft.com/office/mac/drawingml/2011/main" xmlns="" val="1"/>
+              <ma14:wrappingTextBoxFlag xmlns="" xmlns:ma14="http://schemas.microsoft.com/office/mac/drawingml/2011/main" val="1"/>
             </a:ext>
           </a:extLst>
         </p:spPr>
@@ -2756,6 +2793,13 @@
     <a:masterClrMapping/>
   </p:clrMapOvr>
   <p:transition spd="med"/>
+  <p:timing>
+    <p:tnLst>
+      <p:par>
+        <p:cTn id="1" dur="indefinite" restart="never" nodeType="tmRoot"/>
+      </p:par>
+    </p:tnLst>
+  </p:timing>
 </p:sld>
 </file>
 
@@ -2795,7 +2839,7 @@
           </a:ln>
           <a:extLst>
             <a:ext uri="{C572A759-6A51-4108-AA02-DFA0A04FC94B}">
-              <ma14:wrappingTextBoxFlag xmlns:ma14="http://schemas.microsoft.com/office/mac/drawingml/2011/main" xmlns="" val="1"/>
+              <ma14:wrappingTextBoxFlag xmlns="" xmlns:ma14="http://schemas.microsoft.com/office/mac/drawingml/2011/main" val="1"/>
             </a:ext>
           </a:extLst>
         </p:spPr>
@@ -2812,12 +2856,18 @@
               </a:defRPr>
             </a:pPr>
             <a:r>
-              <a:rPr b="0"/>
+              <a:rPr sz="9600" b="0" dirty="0"/>
               <a:t>Welcome to</a:t>
             </a:r>
             <a:r>
-              <a:t> Master the Tidyverse</a:t>
+              <a:rPr sz="9600" dirty="0"/>
+              <a:t> Master the </a:t>
             </a:r>
+            <a:r>
+              <a:rPr sz="9600" dirty="0" err="1"/>
+              <a:t>Tidyverse</a:t>
+            </a:r>
+            <a:endParaRPr sz="9600" dirty="0"/>
           </a:p>
         </p:txBody>
       </p:sp>
@@ -2972,7 +3022,7 @@
           </a:ln>
           <a:extLst>
             <a:ext uri="{C572A759-6A51-4108-AA02-DFA0A04FC94B}">
-              <ma14:wrappingTextBoxFlag xmlns:ma14="http://schemas.microsoft.com/office/mac/drawingml/2011/main" xmlns="" val="1"/>
+              <ma14:wrappingTextBoxFlag xmlns="" xmlns:ma14="http://schemas.microsoft.com/office/mac/drawingml/2011/main" val="1"/>
             </a:ext>
           </a:extLst>
         </p:spPr>
@@ -3038,7 +3088,7 @@
           </a:ln>
           <a:extLst>
             <a:ext uri="{C572A759-6A51-4108-AA02-DFA0A04FC94B}">
-              <ma14:wrappingTextBoxFlag xmlns:ma14="http://schemas.microsoft.com/office/mac/drawingml/2011/main" xmlns="" val="1"/>
+              <ma14:wrappingTextBoxFlag xmlns="" xmlns:ma14="http://schemas.microsoft.com/office/mac/drawingml/2011/main" val="1"/>
             </a:ext>
           </a:extLst>
         </p:spPr>
@@ -3085,7 +3135,7 @@
           </a:ln>
           <a:extLst>
             <a:ext uri="{C572A759-6A51-4108-AA02-DFA0A04FC94B}">
-              <ma14:wrappingTextBoxFlag xmlns:ma14="http://schemas.microsoft.com/office/mac/drawingml/2011/main" xmlns="" val="1"/>
+              <ma14:wrappingTextBoxFlag xmlns="" xmlns:ma14="http://schemas.microsoft.com/office/mac/drawingml/2011/main" val="1"/>
             </a:ext>
           </a:extLst>
         </p:spPr>
@@ -3123,7 +3173,7 @@
           <p:cNvPr id="12" name="Click on .Rmd file to open notebook">
             <a:extLst>
               <a:ext uri="{FF2B5EF4-FFF2-40B4-BE49-F238E27FC236}">
-                <a16:creationId xmlns:a16="http://schemas.microsoft.com/office/drawing/2014/main" id="{74A5B2A1-0CD3-4A47-8AC3-7156CF3B7537}"/>
+                <a16:creationId xmlns:a16="http://schemas.microsoft.com/office/drawing/2014/main" xmlns="" id="{74A5B2A1-0CD3-4A47-8AC3-7156CF3B7537}"/>
               </a:ext>
             </a:extLst>
           </p:cNvPr>
@@ -3150,7 +3200,7 @@
           </a:ln>
           <a:extLst>
             <a:ext uri="{C572A759-6A51-4108-AA02-DFA0A04FC94B}">
-              <ma14:wrappingTextBoxFlag xmlns:ma14="http://schemas.microsoft.com/office/mac/drawingml/2011/main" xmlns="" val="1"/>
+              <ma14:wrappingTextBoxFlag xmlns="" xmlns:ma14="http://schemas.microsoft.com/office/mac/drawingml/2011/main" val="1"/>
             </a:ext>
           </a:extLst>
         </p:spPr>
@@ -3190,7 +3240,7 @@
           <p:cNvPr id="13" name="Editable notebook">
             <a:extLst>
               <a:ext uri="{FF2B5EF4-FFF2-40B4-BE49-F238E27FC236}">
-                <a16:creationId xmlns:a16="http://schemas.microsoft.com/office/drawing/2014/main" id="{13FAE2E6-6CA3-45BE-B585-91848D73645A}"/>
+                <a16:creationId xmlns:a16="http://schemas.microsoft.com/office/drawing/2014/main" xmlns="" id="{13FAE2E6-6CA3-45BE-B585-91848D73645A}"/>
               </a:ext>
             </a:extLst>
           </p:cNvPr>
@@ -3217,7 +3267,7 @@
           </a:ln>
           <a:extLst>
             <a:ext uri="{C572A759-6A51-4108-AA02-DFA0A04FC94B}">
-              <ma14:wrappingTextBoxFlag xmlns:ma14="http://schemas.microsoft.com/office/mac/drawingml/2011/main" xmlns="" val="1"/>
+              <ma14:wrappingTextBoxFlag xmlns="" xmlns:ma14="http://schemas.microsoft.com/office/mac/drawingml/2011/main" val="1"/>
             </a:ext>
           </a:extLst>
         </p:spPr>
@@ -3249,6 +3299,13 @@
     <a:masterClrMapping/>
   </p:clrMapOvr>
   <p:transition spd="med"/>
+  <p:timing>
+    <p:tnLst>
+      <p:par>
+        <p:cTn id="1" dur="indefinite" restart="never" nodeType="tmRoot"/>
+      </p:par>
+    </p:tnLst>
+  </p:timing>
 </p:sld>
 </file>
 
@@ -3455,7 +3512,7 @@
           </a:ln>
           <a:extLst>
             <a:ext uri="{C572A759-6A51-4108-AA02-DFA0A04FC94B}">
-              <ma14:wrappingTextBoxFlag xmlns:ma14="http://schemas.microsoft.com/office/mac/drawingml/2011/main" xmlns="" val="1"/>
+              <ma14:wrappingTextBoxFlag xmlns="" xmlns:ma14="http://schemas.microsoft.com/office/mac/drawingml/2011/main" val="1"/>
             </a:ext>
           </a:extLst>
         </p:spPr>
@@ -3472,12 +3529,18 @@
               </a:defRPr>
             </a:pPr>
             <a:r>
-              <a:rPr b="0"/>
+              <a:rPr sz="9600" b="0" dirty="0"/>
               <a:t>Welcome to</a:t>
             </a:r>
             <a:r>
-              <a:t> Master the Tidyverse</a:t>
+              <a:rPr sz="9600" dirty="0"/>
+              <a:t> Master the </a:t>
             </a:r>
+            <a:r>
+              <a:rPr sz="9600" dirty="0" err="1"/>
+              <a:t>Tidyverse</a:t>
+            </a:r>
+            <a:endParaRPr sz="9600" dirty="0"/>
           </a:p>
         </p:txBody>
       </p:sp>
@@ -3892,7 +3955,7 @@
           </a:ln>
           <a:extLst>
             <a:ext uri="{C572A759-6A51-4108-AA02-DFA0A04FC94B}">
-              <ma14:wrappingTextBoxFlag xmlns:ma14="http://schemas.microsoft.com/office/mac/drawingml/2011/main" xmlns="" val="1"/>
+              <ma14:wrappingTextBoxFlag xmlns="" xmlns:ma14="http://schemas.microsoft.com/office/mac/drawingml/2011/main" val="1"/>
             </a:ext>
           </a:extLst>
         </p:spPr>
@@ -3939,7 +4002,7 @@
           </a:ln>
           <a:extLst>
             <a:ext uri="{C572A759-6A51-4108-AA02-DFA0A04FC94B}">
-              <ma14:wrappingTextBoxFlag xmlns:ma14="http://schemas.microsoft.com/office/mac/drawingml/2011/main" xmlns="" val="1"/>
+              <ma14:wrappingTextBoxFlag xmlns="" xmlns:ma14="http://schemas.microsoft.com/office/mac/drawingml/2011/main" val="1"/>
             </a:ext>
           </a:extLst>
         </p:spPr>
@@ -3978,6 +4041,13 @@
     <a:masterClrMapping/>
   </p:clrMapOvr>
   <p:transition spd="med"/>
+  <p:timing>
+    <p:tnLst>
+      <p:par>
+        <p:cTn id="1" dur="indefinite" restart="never" nodeType="tmRoot"/>
+      </p:par>
+    </p:tnLst>
+  </p:timing>
 </p:sld>
 </file>
 
@@ -4184,7 +4254,7 @@
           </a:ln>
           <a:extLst>
             <a:ext uri="{C572A759-6A51-4108-AA02-DFA0A04FC94B}">
-              <ma14:wrappingTextBoxFlag xmlns:ma14="http://schemas.microsoft.com/office/mac/drawingml/2011/main" xmlns="" val="1"/>
+              <ma14:wrappingTextBoxFlag xmlns="" xmlns:ma14="http://schemas.microsoft.com/office/mac/drawingml/2011/main" val="1"/>
             </a:ext>
           </a:extLst>
         </p:spPr>
@@ -4201,12 +4271,18 @@
               </a:defRPr>
             </a:pPr>
             <a:r>
-              <a:rPr b="0"/>
+              <a:rPr sz="9600" b="0" dirty="0"/>
               <a:t>Welcome to</a:t>
             </a:r>
             <a:r>
-              <a:t> Master the Tidyverse</a:t>
+              <a:rPr sz="9600" dirty="0"/>
+              <a:t> Master the </a:t>
             </a:r>
+            <a:r>
+              <a:rPr sz="9600" dirty="0" err="1"/>
+              <a:t>Tidyverse</a:t>
+            </a:r>
+            <a:endParaRPr sz="9600" dirty="0"/>
           </a:p>
         </p:txBody>
       </p:sp>
@@ -4621,7 +4697,7 @@
           </a:ln>
           <a:extLst>
             <a:ext uri="{C572A759-6A51-4108-AA02-DFA0A04FC94B}">
-              <ma14:wrappingTextBoxFlag xmlns:ma14="http://schemas.microsoft.com/office/mac/drawingml/2011/main" xmlns="" val="1"/>
+              <ma14:wrappingTextBoxFlag xmlns="" xmlns:ma14="http://schemas.microsoft.com/office/mac/drawingml/2011/main" val="1"/>
             </a:ext>
           </a:extLst>
         </p:spPr>
@@ -4668,7 +4744,7 @@
           </a:ln>
           <a:extLst>
             <a:ext uri="{C572A759-6A51-4108-AA02-DFA0A04FC94B}">
-              <ma14:wrappingTextBoxFlag xmlns:ma14="http://schemas.microsoft.com/office/mac/drawingml/2011/main" xmlns="" val="1"/>
+              <ma14:wrappingTextBoxFlag xmlns="" xmlns:ma14="http://schemas.microsoft.com/office/mac/drawingml/2011/main" val="1"/>
             </a:ext>
           </a:extLst>
         </p:spPr>
@@ -4706,7 +4782,7 @@
           <p:cNvPr id="21" name="Click to run code in chunk">
             <a:extLst>
               <a:ext uri="{FF2B5EF4-FFF2-40B4-BE49-F238E27FC236}">
-                <a16:creationId xmlns:a16="http://schemas.microsoft.com/office/drawing/2014/main" id="{0DD80CE6-4D18-4B51-8A26-A6277F6A770D}"/>
+                <a16:creationId xmlns:a16="http://schemas.microsoft.com/office/drawing/2014/main" xmlns="" id="{0DD80CE6-4D18-4B51-8A26-A6277F6A770D}"/>
               </a:ext>
             </a:extLst>
           </p:cNvPr>
@@ -4733,7 +4809,7 @@
           </a:ln>
           <a:extLst>
             <a:ext uri="{C572A759-6A51-4108-AA02-DFA0A04FC94B}">
-              <ma14:wrappingTextBoxFlag xmlns:ma14="http://schemas.microsoft.com/office/mac/drawingml/2011/main" xmlns="" val="1"/>
+              <ma14:wrappingTextBoxFlag xmlns="" xmlns:ma14="http://schemas.microsoft.com/office/mac/drawingml/2011/main" val="1"/>
             </a:ext>
           </a:extLst>
         </p:spPr>
@@ -4765,6 +4841,13 @@
     <a:masterClrMapping/>
   </p:clrMapOvr>
   <p:transition spd="med"/>
+  <p:timing>
+    <p:tnLst>
+      <p:par>
+        <p:cTn id="1" dur="indefinite" restart="never" nodeType="tmRoot"/>
+      </p:par>
+    </p:tnLst>
+  </p:timing>
 </p:sld>
 </file>
 
@@ -4971,7 +5054,7 @@
           </a:ln>
           <a:extLst>
             <a:ext uri="{C572A759-6A51-4108-AA02-DFA0A04FC94B}">
-              <ma14:wrappingTextBoxFlag xmlns:ma14="http://schemas.microsoft.com/office/mac/drawingml/2011/main" xmlns="" val="1"/>
+              <ma14:wrappingTextBoxFlag xmlns="" xmlns:ma14="http://schemas.microsoft.com/office/mac/drawingml/2011/main" val="1"/>
             </a:ext>
           </a:extLst>
         </p:spPr>
@@ -4988,12 +5071,18 @@
               </a:defRPr>
             </a:pPr>
             <a:r>
-              <a:rPr b="0"/>
+              <a:rPr sz="9600" b="0" dirty="0"/>
               <a:t>Welcome to</a:t>
             </a:r>
             <a:r>
-              <a:t> Master the Tidyverse</a:t>
+              <a:rPr sz="9600" dirty="0"/>
+              <a:t> Master the </a:t>
             </a:r>
+            <a:r>
+              <a:rPr sz="9600" dirty="0" err="1"/>
+              <a:t>Tidyverse</a:t>
+            </a:r>
+            <a:endParaRPr sz="9600" dirty="0"/>
           </a:p>
         </p:txBody>
       </p:sp>
@@ -5265,7 +5354,7 @@
           </a:ln>
           <a:extLst>
             <a:ext uri="{C572A759-6A51-4108-AA02-DFA0A04FC94B}">
-              <ma14:wrappingTextBoxFlag xmlns:ma14="http://schemas.microsoft.com/office/mac/drawingml/2011/main" xmlns="" val="1"/>
+              <ma14:wrappingTextBoxFlag xmlns="" xmlns:ma14="http://schemas.microsoft.com/office/mac/drawingml/2011/main" val="1"/>
             </a:ext>
           </a:extLst>
         </p:spPr>
@@ -5464,7 +5553,7 @@
           </a:ln>
           <a:extLst>
             <a:ext uri="{C572A759-6A51-4108-AA02-DFA0A04FC94B}">
-              <ma14:wrappingTextBoxFlag xmlns:ma14="http://schemas.microsoft.com/office/mac/drawingml/2011/main" xmlns="" val="1"/>
+              <ma14:wrappingTextBoxFlag xmlns="" xmlns:ma14="http://schemas.microsoft.com/office/mac/drawingml/2011/main" val="1"/>
             </a:ext>
           </a:extLst>
         </p:spPr>
@@ -5511,7 +5600,7 @@
           </a:ln>
           <a:extLst>
             <a:ext uri="{C572A759-6A51-4108-AA02-DFA0A04FC94B}">
-              <ma14:wrappingTextBoxFlag xmlns:ma14="http://schemas.microsoft.com/office/mac/drawingml/2011/main" xmlns="" val="1"/>
+              <ma14:wrappingTextBoxFlag xmlns="" xmlns:ma14="http://schemas.microsoft.com/office/mac/drawingml/2011/main" val="1"/>
             </a:ext>
           </a:extLst>
         </p:spPr>
@@ -5549,7 +5638,7 @@
           <p:cNvPr id="23" name="Click to run code in chunk">
             <a:extLst>
               <a:ext uri="{FF2B5EF4-FFF2-40B4-BE49-F238E27FC236}">
-                <a16:creationId xmlns:a16="http://schemas.microsoft.com/office/drawing/2014/main" id="{2A0F47CE-DCCF-4BEB-8EB9-51CEBA444E86}"/>
+                <a16:creationId xmlns:a16="http://schemas.microsoft.com/office/drawing/2014/main" xmlns="" id="{2A0F47CE-DCCF-4BEB-8EB9-51CEBA444E86}"/>
               </a:ext>
             </a:extLst>
           </p:cNvPr>
@@ -5576,7 +5665,7 @@
           </a:ln>
           <a:extLst>
             <a:ext uri="{C572A759-6A51-4108-AA02-DFA0A04FC94B}">
-              <ma14:wrappingTextBoxFlag xmlns:ma14="http://schemas.microsoft.com/office/mac/drawingml/2011/main" xmlns="" val="1"/>
+              <ma14:wrappingTextBoxFlag xmlns="" xmlns:ma14="http://schemas.microsoft.com/office/mac/drawingml/2011/main" val="1"/>
             </a:ext>
           </a:extLst>
         </p:spPr>
@@ -5608,6 +5697,13 @@
     <a:masterClrMapping/>
   </p:clrMapOvr>
   <p:transition spd="med"/>
+  <p:timing>
+    <p:tnLst>
+      <p:par>
+        <p:cTn id="1" dur="indefinite" restart="never" nodeType="tmRoot"/>
+      </p:par>
+    </p:tnLst>
+  </p:timing>
 </p:sld>
 </file>
 
@@ -5814,7 +5910,7 @@
           </a:ln>
           <a:extLst>
             <a:ext uri="{C572A759-6A51-4108-AA02-DFA0A04FC94B}">
-              <ma14:wrappingTextBoxFlag xmlns:ma14="http://schemas.microsoft.com/office/mac/drawingml/2011/main" xmlns="" val="1"/>
+              <ma14:wrappingTextBoxFlag xmlns="" xmlns:ma14="http://schemas.microsoft.com/office/mac/drawingml/2011/main" val="1"/>
             </a:ext>
           </a:extLst>
         </p:spPr>
@@ -5831,12 +5927,18 @@
               </a:defRPr>
             </a:pPr>
             <a:r>
-              <a:rPr b="0"/>
+              <a:rPr sz="9600" b="0" dirty="0"/>
               <a:t>Welcome to</a:t>
             </a:r>
             <a:r>
-              <a:t> Master the Tidyverse</a:t>
+              <a:rPr sz="9600" dirty="0"/>
+              <a:t> Master the </a:t>
             </a:r>
+            <a:r>
+              <a:rPr sz="9600" dirty="0" err="1"/>
+              <a:t>Tidyverse</a:t>
+            </a:r>
+            <a:endParaRPr sz="9600" dirty="0"/>
           </a:p>
         </p:txBody>
       </p:sp>
@@ -5859,7 +5961,7 @@
           </a:ln>
           <a:extLst>
             <a:ext uri="{C572A759-6A51-4108-AA02-DFA0A04FC94B}">
-              <ma14:wrappingTextBoxFlag xmlns:ma14="http://schemas.microsoft.com/office/mac/drawingml/2011/main" xmlns="" val="1"/>
+              <ma14:wrappingTextBoxFlag xmlns="" xmlns:ma14="http://schemas.microsoft.com/office/mac/drawingml/2011/main" val="1"/>
             </a:ext>
           </a:extLst>
         </p:spPr>
@@ -6313,7 +6415,7 @@
           </a:ln>
           <a:extLst>
             <a:ext uri="{C572A759-6A51-4108-AA02-DFA0A04FC94B}">
-              <ma14:wrappingTextBoxFlag xmlns:ma14="http://schemas.microsoft.com/office/mac/drawingml/2011/main" xmlns="" val="1"/>
+              <ma14:wrappingTextBoxFlag xmlns="" xmlns:ma14="http://schemas.microsoft.com/office/mac/drawingml/2011/main" val="1"/>
             </a:ext>
           </a:extLst>
         </p:spPr>
@@ -6358,7 +6460,7 @@
           </a:ln>
           <a:extLst>
             <a:ext uri="{C572A759-6A51-4108-AA02-DFA0A04FC94B}">
-              <ma14:wrappingTextBoxFlag xmlns:ma14="http://schemas.microsoft.com/office/mac/drawingml/2011/main" xmlns="" val="1"/>
+              <ma14:wrappingTextBoxFlag xmlns="" xmlns:ma14="http://schemas.microsoft.com/office/mac/drawingml/2011/main" val="1"/>
             </a:ext>
           </a:extLst>
         </p:spPr>
@@ -6391,7 +6493,7 @@
           <p:cNvPr id="24" name="Click to run all code chunks above">
             <a:extLst>
               <a:ext uri="{FF2B5EF4-FFF2-40B4-BE49-F238E27FC236}">
-                <a16:creationId xmlns:a16="http://schemas.microsoft.com/office/drawing/2014/main" id="{0F82C270-7692-47D4-8243-9E082F50BC07}"/>
+                <a16:creationId xmlns:a16="http://schemas.microsoft.com/office/drawing/2014/main" xmlns="" id="{0F82C270-7692-47D4-8243-9E082F50BC07}"/>
               </a:ext>
             </a:extLst>
           </p:cNvPr>
@@ -6418,7 +6520,7 @@
           </a:ln>
           <a:extLst>
             <a:ext uri="{C572A759-6A51-4108-AA02-DFA0A04FC94B}">
-              <ma14:wrappingTextBoxFlag xmlns:ma14="http://schemas.microsoft.com/office/mac/drawingml/2011/main" xmlns="" val="1"/>
+              <ma14:wrappingTextBoxFlag xmlns="" xmlns:ma14="http://schemas.microsoft.com/office/mac/drawingml/2011/main" val="1"/>
             </a:ext>
           </a:extLst>
         </p:spPr>
@@ -6453,7 +6555,7 @@
           <p:cNvPr id="25" name="Click to run code in chunk">
             <a:extLst>
               <a:ext uri="{FF2B5EF4-FFF2-40B4-BE49-F238E27FC236}">
-                <a16:creationId xmlns:a16="http://schemas.microsoft.com/office/drawing/2014/main" id="{04A9C4EF-0051-4A5B-8CB9-72F0907CF2E3}"/>
+                <a16:creationId xmlns:a16="http://schemas.microsoft.com/office/drawing/2014/main" xmlns="" id="{04A9C4EF-0051-4A5B-8CB9-72F0907CF2E3}"/>
               </a:ext>
             </a:extLst>
           </p:cNvPr>
@@ -6480,7 +6582,7 @@
           </a:ln>
           <a:extLst>
             <a:ext uri="{C572A759-6A51-4108-AA02-DFA0A04FC94B}">
-              <ma14:wrappingTextBoxFlag xmlns:ma14="http://schemas.microsoft.com/office/mac/drawingml/2011/main" xmlns="" val="1"/>
+              <ma14:wrappingTextBoxFlag xmlns="" xmlns:ma14="http://schemas.microsoft.com/office/mac/drawingml/2011/main" val="1"/>
             </a:ext>
           </a:extLst>
         </p:spPr>
@@ -6512,6 +6614,13 @@
     <a:masterClrMapping/>
   </p:clrMapOvr>
   <p:transition spd="med"/>
+  <p:timing>
+    <p:tnLst>
+      <p:par>
+        <p:cTn id="1" dur="indefinite" restart="never" nodeType="tmRoot"/>
+      </p:par>
+    </p:tnLst>
+  </p:timing>
 </p:sld>
 </file>
 

</xml_diff>